<commit_message>
add slide on which files should be checked in/added to VS Proj
</commit_message>
<xml_diff>
--- a/Intro to NPM, Gulp, and Bower.pptx
+++ b/Intro to NPM, Gulp, and Bower.pptx
@@ -5,7 +5,7 @@
     <p:sldMasterId id="2147483660" r:id="rId2"/>
   </p:sldMasterIdLst>
   <p:notesMasterIdLst>
-    <p:notesMasterId r:id="rId37"/>
+    <p:notesMasterId r:id="rId38"/>
   </p:notesMasterIdLst>
   <p:sldIdLst>
     <p:sldId id="256" r:id="rId3"/>
@@ -40,8 +40,9 @@
     <p:sldId id="292" r:id="rId32"/>
     <p:sldId id="293" r:id="rId33"/>
     <p:sldId id="294" r:id="rId34"/>
-    <p:sldId id="275" r:id="rId35"/>
-    <p:sldId id="263" r:id="rId36"/>
+    <p:sldId id="297" r:id="rId35"/>
+    <p:sldId id="275" r:id="rId36"/>
+    <p:sldId id="263" r:id="rId37"/>
   </p:sldIdLst>
   <p:sldSz cx="12192000" cy="6858000"/>
   <p:notesSz cx="6858000" cy="9144000"/>
@@ -247,7 +248,7 @@
           <a:p>
             <a:fld id="{EC13577B-6902-467D-A26C-08A0DD5E4E03}" type="datetimeFigureOut">
               <a:rPr lang="en-US" smtClean="0"/>
-              <a:t>2/21/2016</a:t>
+              <a:t>2/22/2016</a:t>
             </a:fld>
             <a:endParaRPr lang="en-US"/>
           </a:p>
@@ -681,7 +682,7 @@
           <a:p>
             <a:fld id="{DF61EA0F-A667-4B49-8422-0062BC55E249}" type="slidenum">
               <a:rPr lang="en-US" smtClean="0"/>
-              <a:t>34</a:t>
+              <a:t>35</a:t>
             </a:fld>
             <a:endParaRPr lang="en-US"/>
           </a:p>
@@ -895,7 +896,7 @@
           <a:p>
             <a:fld id="{8BEEBAAA-29B5-4AF5-BC5F-7E580C29002D}" type="datetimeFigureOut">
               <a:rPr lang="en-US" smtClean="0"/>
-              <a:t>2/21/2016</a:t>
+              <a:t>2/22/2016</a:t>
             </a:fld>
             <a:endParaRPr lang="en-US"/>
           </a:p>
@@ -1170,7 +1171,7 @@
           <a:p>
             <a:fld id="{8BEEBAAA-29B5-4AF5-BC5F-7E580C29002D}" type="datetimeFigureOut">
               <a:rPr lang="en-US" smtClean="0"/>
-              <a:t>2/21/2016</a:t>
+              <a:t>2/22/2016</a:t>
             </a:fld>
             <a:endParaRPr lang="en-US"/>
           </a:p>
@@ -1451,7 +1452,7 @@
           <a:p>
             <a:fld id="{8BEEBAAA-29B5-4AF5-BC5F-7E580C29002D}" type="datetimeFigureOut">
               <a:rPr lang="en-US" smtClean="0"/>
-              <a:t>2/21/2016</a:t>
+              <a:t>2/22/2016</a:t>
             </a:fld>
             <a:endParaRPr lang="en-US"/>
           </a:p>
@@ -1812,7 +1813,7 @@
           <a:p>
             <a:fld id="{8BEEBAAA-29B5-4AF5-BC5F-7E580C29002D}" type="datetimeFigureOut">
               <a:rPr lang="en-US" smtClean="0"/>
-              <a:t>2/21/2016</a:t>
+              <a:t>2/22/2016</a:t>
             </a:fld>
             <a:endParaRPr lang="en-US"/>
           </a:p>
@@ -2112,7 +2113,7 @@
           <a:p>
             <a:fld id="{8BEEBAAA-29B5-4AF5-BC5F-7E580C29002D}" type="datetimeFigureOut">
               <a:rPr lang="en-US" smtClean="0"/>
-              <a:t>2/21/2016</a:t>
+              <a:t>2/22/2016</a:t>
             </a:fld>
             <a:endParaRPr lang="en-US"/>
           </a:p>
@@ -2625,7 +2626,7 @@
           <a:p>
             <a:fld id="{8BEEBAAA-29B5-4AF5-BC5F-7E580C29002D}" type="datetimeFigureOut">
               <a:rPr lang="en-US" smtClean="0"/>
-              <a:t>2/21/2016</a:t>
+              <a:t>2/22/2016</a:t>
             </a:fld>
             <a:endParaRPr lang="en-US"/>
           </a:p>
@@ -3268,7 +3269,7 @@
           <a:p>
             <a:fld id="{8BEEBAAA-29B5-4AF5-BC5F-7E580C29002D}" type="datetimeFigureOut">
               <a:rPr lang="en-US" smtClean="0"/>
-              <a:t>2/21/2016</a:t>
+              <a:t>2/22/2016</a:t>
             </a:fld>
             <a:endParaRPr lang="en-US"/>
           </a:p>
@@ -3493,7 +3494,7 @@
           <a:p>
             <a:fld id="{8BEEBAAA-29B5-4AF5-BC5F-7E580C29002D}" type="datetimeFigureOut">
               <a:rPr lang="en-US" smtClean="0"/>
-              <a:t>2/21/2016</a:t>
+              <a:t>2/22/2016</a:t>
             </a:fld>
             <a:endParaRPr lang="en-US"/>
           </a:p>
@@ -3634,7 +3635,7 @@
           <a:p>
             <a:fld id="{8BEEBAAA-29B5-4AF5-BC5F-7E580C29002D}" type="datetimeFigureOut">
               <a:rPr lang="en-US" smtClean="0"/>
-              <a:t>2/21/2016</a:t>
+              <a:t>2/22/2016</a:t>
             </a:fld>
             <a:endParaRPr lang="en-US"/>
           </a:p>
@@ -3969,7 +3970,7 @@
           <a:p>
             <a:fld id="{8BEEBAAA-29B5-4AF5-BC5F-7E580C29002D}" type="datetimeFigureOut">
               <a:rPr lang="en-US" smtClean="0"/>
-              <a:t>2/21/2016</a:t>
+              <a:t>2/22/2016</a:t>
             </a:fld>
             <a:endParaRPr lang="en-US"/>
           </a:p>
@@ -4224,7 +4225,7 @@
           <a:p>
             <a:fld id="{8BEEBAAA-29B5-4AF5-BC5F-7E580C29002D}" type="datetimeFigureOut">
               <a:rPr lang="en-US" smtClean="0"/>
-              <a:t>2/21/2016</a:t>
+              <a:t>2/22/2016</a:t>
             </a:fld>
             <a:endParaRPr lang="en-US"/>
           </a:p>
@@ -4435,7 +4436,7 @@
           <a:p>
             <a:fld id="{8BEEBAAA-29B5-4AF5-BC5F-7E580C29002D}" type="datetimeFigureOut">
               <a:rPr lang="en-US" smtClean="0"/>
-              <a:t>2/21/2016</a:t>
+              <a:t>2/22/2016</a:t>
             </a:fld>
             <a:endParaRPr lang="en-US"/>
           </a:p>
@@ -11247,6 +11248,236 @@
           <a:p>
             <a:r>
               <a:rPr lang="en-US" dirty="0"/>
+              <a:t>Which files go in Source Control?</a:t>
+            </a:r>
+            <a:br>
+              <a:rPr lang="en-US" dirty="0"/>
+            </a:br>
+            <a:r>
+              <a:rPr lang="en-US" dirty="0"/>
+              <a:t>Which go in Visual </a:t>
+            </a:r>
+            <a:r>
+              <a:rPr lang="en-US" dirty="0" err="1"/>
+              <a:t>Studo</a:t>
+            </a:r>
+            <a:r>
+              <a:rPr lang="en-US" dirty="0"/>
+              <a:t> Project?</a:t>
+            </a:r>
+          </a:p>
+        </p:txBody>
+      </p:sp>
+      <p:sp>
+        <p:nvSpPr>
+          <p:cNvPr id="3" name="Content Placeholder 2"/>
+          <p:cNvSpPr>
+            <a:spLocks noGrp="1"/>
+          </p:cNvSpPr>
+          <p:nvPr>
+            <p:ph idx="1"/>
+          </p:nvPr>
+        </p:nvSpPr>
+        <p:spPr>
+          <a:xfrm>
+            <a:off x="838201" y="1825625"/>
+            <a:ext cx="10515600" cy="4351338"/>
+          </a:xfrm>
+        </p:spPr>
+        <p:txBody>
+          <a:bodyPr>
+            <a:normAutofit fontScale="92500" lnSpcReduction="20000"/>
+          </a:bodyPr>
+          <a:lstStyle/>
+          <a:p>
+            <a:r>
+              <a:rPr lang="en-US" dirty="0"/>
+              <a:t>Source files that you edit should go in Source Control and be part of your Visual Studio Web Project.</a:t>
+            </a:r>
+          </a:p>
+          <a:p>
+            <a:r>
+              <a:rPr lang="en-US" dirty="0"/>
+              <a:t>Examples of this from the example project include </a:t>
+            </a:r>
+            <a:r>
+              <a:rPr lang="en-US" b="1" dirty="0"/>
+              <a:t>./</a:t>
+            </a:r>
+            <a:r>
+              <a:rPr lang="en-US" b="1" dirty="0" err="1"/>
+              <a:t>css</a:t>
+            </a:r>
+            <a:r>
+              <a:rPr lang="en-US" b="1" dirty="0"/>
+              <a:t>/</a:t>
+            </a:r>
+            <a:r>
+              <a:rPr lang="en-US" b="1" dirty="0" err="1"/>
+              <a:t>global.scss</a:t>
+            </a:r>
+            <a:r>
+              <a:rPr lang="en-US" dirty="0"/>
+              <a:t> and </a:t>
+            </a:r>
+            <a:r>
+              <a:rPr lang="en-US" b="1" dirty="0"/>
+              <a:t>./scripts/helloWorld.js.</a:t>
+            </a:r>
+          </a:p>
+          <a:p>
+            <a:r>
+              <a:rPr lang="en-US" dirty="0"/>
+              <a:t>Outputs of </a:t>
+            </a:r>
+            <a:r>
+              <a:rPr lang="en-US" dirty="0" err="1"/>
+              <a:t>Transpilation</a:t>
+            </a:r>
+            <a:r>
+              <a:rPr lang="en-US" dirty="0"/>
+              <a:t> or other </a:t>
+            </a:r>
+            <a:r>
+              <a:rPr lang="en-US"/>
+              <a:t>minification </a:t>
+            </a:r>
+            <a:r>
+              <a:rPr lang="en-US" dirty="0"/>
+              <a:t>should go in your Visual Studio Web Project, but not in Source Control. There is no point in putting the file in source control as it will be re-generated every time you run the Gulp Task and it will cause needless commits and merges. These files do need to be in your VS Project as this will make it easier to ensure that the files get included when you deploy and that </a:t>
+            </a:r>
+            <a:r>
+              <a:rPr lang="en-US" dirty="0" err="1"/>
+              <a:t>IISExpress</a:t>
+            </a:r>
+            <a:r>
+              <a:rPr lang="en-US" dirty="0"/>
+              <a:t> can find then when you are running the site locally.</a:t>
+            </a:r>
+          </a:p>
+          <a:p>
+            <a:r>
+              <a:rPr lang="en-US" dirty="0"/>
+              <a:t>Examples of these files are </a:t>
+            </a:r>
+            <a:r>
+              <a:rPr lang="en-US" b="1" dirty="0"/>
+              <a:t>./</a:t>
+            </a:r>
+            <a:r>
+              <a:rPr lang="en-US" b="1" dirty="0" err="1"/>
+              <a:t>css</a:t>
+            </a:r>
+            <a:r>
+              <a:rPr lang="en-US" b="1" dirty="0"/>
+              <a:t>/all.css</a:t>
+            </a:r>
+            <a:r>
+              <a:rPr lang="en-US" dirty="0"/>
+              <a:t> and </a:t>
+            </a:r>
+            <a:r>
+              <a:rPr lang="en-US" b="1" dirty="0"/>
+              <a:t>./scripts/all.js.</a:t>
+            </a:r>
+          </a:p>
+          <a:p>
+            <a:r>
+              <a:rPr lang="en-US" dirty="0"/>
+              <a:t>Any Intermediate files do not need to be included in Source Control or the Visual Studio project.</a:t>
+            </a:r>
+          </a:p>
+          <a:p>
+            <a:r>
+              <a:rPr lang="en-US" dirty="0"/>
+              <a:t>An Example of this type of file is </a:t>
+            </a:r>
+            <a:r>
+              <a:rPr lang="en-US" b="1" dirty="0"/>
+              <a:t>./</a:t>
+            </a:r>
+            <a:r>
+              <a:rPr lang="en-US" b="1" dirty="0" err="1"/>
+              <a:t>css</a:t>
+            </a:r>
+            <a:r>
+              <a:rPr lang="en-US" b="1" dirty="0"/>
+              <a:t>/global.css.</a:t>
+            </a:r>
+            <a:r>
+              <a:rPr lang="en-US" dirty="0"/>
+              <a:t> This file is the output from the </a:t>
+            </a:r>
+            <a:r>
+              <a:rPr lang="en-US" b="1" dirty="0"/>
+              <a:t>app-</a:t>
+            </a:r>
+            <a:r>
+              <a:rPr lang="en-US" b="1" dirty="0" err="1"/>
+              <a:t>scss</a:t>
+            </a:r>
+            <a:r>
+              <a:rPr lang="en-US" dirty="0"/>
+              <a:t> task but is only used when it is concatenated into </a:t>
+            </a:r>
+            <a:r>
+              <a:rPr lang="en-US" b="1" dirty="0"/>
+              <a:t>all.css.</a:t>
+            </a:r>
+            <a:r>
+              <a:rPr lang="en-US" dirty="0"/>
+              <a:t> </a:t>
+            </a:r>
+          </a:p>
+        </p:txBody>
+      </p:sp>
+    </p:spTree>
+    <p:extLst>
+      <p:ext uri="{BB962C8B-B14F-4D97-AF65-F5344CB8AC3E}">
+        <p14:creationId xmlns:p14="http://schemas.microsoft.com/office/powerpoint/2010/main" val="827753584"/>
+      </p:ext>
+    </p:extLst>
+  </p:cSld>
+  <p:clrMapOvr>
+    <a:masterClrMapping/>
+  </p:clrMapOvr>
+</p:sld>
+</file>
+
+<file path=ppt/slides/slide34.xml><?xml version="1.0" encoding="utf-8"?>
+<p:sld xmlns:a="http://schemas.openxmlformats.org/drawingml/2006/main" xmlns:r="http://schemas.openxmlformats.org/officeDocument/2006/relationships" xmlns:p="http://schemas.openxmlformats.org/presentationml/2006/main">
+  <p:cSld>
+    <p:spTree>
+      <p:nvGrpSpPr>
+        <p:cNvPr id="1" name=""/>
+        <p:cNvGrpSpPr/>
+        <p:nvPr/>
+      </p:nvGrpSpPr>
+      <p:grpSpPr>
+        <a:xfrm>
+          <a:off x="0" y="0"/>
+          <a:ext cx="0" cy="0"/>
+          <a:chOff x="0" y="0"/>
+          <a:chExt cx="0" cy="0"/>
+        </a:xfrm>
+      </p:grpSpPr>
+      <p:sp>
+        <p:nvSpPr>
+          <p:cNvPr id="2" name="Title 1"/>
+          <p:cNvSpPr>
+            <a:spLocks noGrp="1"/>
+          </p:cNvSpPr>
+          <p:nvPr>
+            <p:ph type="title"/>
+          </p:nvPr>
+        </p:nvSpPr>
+        <p:spPr/>
+        <p:txBody>
+          <a:bodyPr/>
+          <a:lstStyle/>
+          <a:p>
+            <a:r>
+              <a:rPr lang="en-US" dirty="0"/>
               <a:t>Resources</a:t>
             </a:r>
           </a:p>
@@ -11438,7 +11669,7 @@
 </p:sld>
 </file>
 
-<file path=ppt/slides/slide34.xml><?xml version="1.0" encoding="utf-8"?>
+<file path=ppt/slides/slide35.xml><?xml version="1.0" encoding="utf-8"?>
 <p:sld xmlns:a="http://schemas.openxmlformats.org/drawingml/2006/main" xmlns:r="http://schemas.openxmlformats.org/officeDocument/2006/relationships" xmlns:p="http://schemas.openxmlformats.org/presentationml/2006/main">
   <p:cSld>
     <p:spTree>

</xml_diff>